<commit_message>
Update Schreibweise Bald / Bold
</commit_message>
<xml_diff>
--- a/Präsentation_Bald.pptx
+++ b/Präsentation_Bald.pptx
@@ -271,7 +271,7 @@
           </a:lstStyle>
           <a:p>
             <a:fld id="{75BEE995-72F4-482A-B547-037217EEA661}" type="datetimeFigureOut">
-              <a:t>27.04.2025</a:t>
+              <a:t>28.04.2025</a:t>
             </a:fld>
             <a:endParaRPr lang="de-DE"/>
           </a:p>
@@ -2068,7 +2068,7 @@
           <a:p>
             <a:fld id="{4E96B16B-3D02-421E-9A22-E7AF4889F0FE}" type="datetime1">
               <a:rPr lang="en-US" smtClean="0"/>
-              <a:t>4/27/2025</a:t>
+              <a:t>4/28/2025</a:t>
             </a:fld>
             <a:endParaRPr lang="en-US"/>
           </a:p>
@@ -2270,7 +2270,7 @@
           <a:p>
             <a:fld id="{DB775AC6-EFC6-47B7-8612-9DA8DD25D955}" type="datetime1">
               <a:rPr lang="en-US" smtClean="0"/>
-              <a:t>4/27/2025</a:t>
+              <a:t>4/28/2025</a:t>
             </a:fld>
             <a:endParaRPr lang="en-US"/>
           </a:p>
@@ -2614,7 +2614,7 @@
           <a:p>
             <a:fld id="{6AA36526-50D6-4421-A203-614B20CF2703}" type="datetime1">
               <a:rPr lang="en-US" smtClean="0"/>
-              <a:t>4/27/2025</a:t>
+              <a:t>4/28/2025</a:t>
             </a:fld>
             <a:endParaRPr lang="en-US"/>
           </a:p>
@@ -2873,7 +2873,7 @@
           <a:p>
             <a:fld id="{75E84928-FE16-43B9-BC25-2859501720EA}" type="datetime1">
               <a:rPr lang="en-US" smtClean="0"/>
-              <a:t>4/27/2025</a:t>
+              <a:t>4/28/2025</a:t>
             </a:fld>
             <a:endParaRPr lang="en-US"/>
           </a:p>
@@ -3293,7 +3293,7 @@
           <a:p>
             <a:fld id="{52B94D21-0962-4C08-BB57-BC7507DEE084}" type="datetime1">
               <a:rPr lang="en-US" smtClean="0"/>
-              <a:t>4/27/2025</a:t>
+              <a:t>4/28/2025</a:t>
             </a:fld>
             <a:endParaRPr lang="en-US"/>
           </a:p>
@@ -3746,7 +3746,7 @@
           <a:p>
             <a:fld id="{EF075700-B54E-437C-8A31-0CC21845C39D}" type="datetime1">
               <a:rPr lang="en-US" smtClean="0"/>
-              <a:t>4/27/2025</a:t>
+              <a:t>4/28/2025</a:t>
             </a:fld>
             <a:endParaRPr lang="en-US"/>
           </a:p>
@@ -4298,7 +4298,7 @@
           <a:p>
             <a:fld id="{A7472505-C2E4-4560-87BD-F72139D98800}" type="datetime1">
               <a:rPr lang="en-US" smtClean="0"/>
-              <a:t>4/27/2025</a:t>
+              <a:t>4/28/2025</a:t>
             </a:fld>
             <a:endParaRPr lang="en-US"/>
           </a:p>
@@ -4575,7 +4575,7 @@
           <a:p>
             <a:fld id="{688C6202-6C0C-4936-9181-C3BAC183F367}" type="datetime1">
               <a:rPr lang="en-US" smtClean="0"/>
-              <a:t>4/27/2025</a:t>
+              <a:t>4/28/2025</a:t>
             </a:fld>
             <a:endParaRPr lang="en-US"/>
           </a:p>
@@ -4824,7 +4824,7 @@
           <a:p>
             <a:fld id="{B9C3A1C5-5A4D-40F5-AA30-2E2FA551A28A}" type="datetime1">
               <a:rPr lang="en-US" smtClean="0"/>
-              <a:t>4/27/2025</a:t>
+              <a:t>4/28/2025</a:t>
             </a:fld>
             <a:endParaRPr lang="en-US"/>
           </a:p>
@@ -5277,7 +5277,7 @@
           <a:p>
             <a:fld id="{A3AFC84A-6073-47BB-AA17-B11F88B48FFC}" type="datetime1">
               <a:rPr lang="en-US" smtClean="0"/>
-              <a:t>4/27/2025</a:t>
+              <a:t>4/28/2025</a:t>
             </a:fld>
             <a:endParaRPr lang="en-US"/>
           </a:p>
@@ -5705,7 +5705,7 @@
           <a:p>
             <a:fld id="{049970C6-98BD-4B9C-9DB4-A09FCA6FDD64}" type="datetime1">
               <a:rPr lang="en-US" smtClean="0"/>
-              <a:t>4/27/2025</a:t>
+              <a:t>4/28/2025</a:t>
             </a:fld>
             <a:endParaRPr lang="en-US"/>
           </a:p>
@@ -6313,7 +6313,7 @@
           <a:p>
             <a:fld id="{F21DBC69-2876-4ACB-95B6-39F77D4C7E0D}" type="datetime1">
               <a:rPr lang="en-US" smtClean="0"/>
-              <a:t>4/27/2025</a:t>
+              <a:t>4/28/2025</a:t>
             </a:fld>
             <a:r>
               <a:rPr lang="en-US"/>
@@ -6361,15 +6361,7 @@
           <a:p>
             <a:r>
               <a:rPr lang="de-DE" sz="1200" i="1" dirty="0"/>
-              <a:t>Matthias </a:t>
-            </a:r>
-            <a:r>
-              <a:rPr lang="de-DE" sz="1200" i="1" dirty="0" err="1"/>
-              <a:t>Bold</a:t>
-            </a:r>
-            <a:r>
-              <a:rPr lang="de-DE" sz="1200" i="1" dirty="0"/>
-              <a:t> | David </a:t>
+              <a:t>Matthias Bald | David </a:t>
             </a:r>
             <a:r>
               <a:rPr lang="de-DE" sz="1200" i="1" dirty="0" err="1"/>

</xml_diff>